<commit_message>
text: add font.color.brightness getter
</commit_message>
<xml_diff>
--- a/features/steps/test_files/font-color.pptx
+++ b/features/steps/test_files/font-color.pptx
@@ -438,7 +438,7 @@
         </p:nvSpPr>
         <p:spPr>
           <a:xfrm>
-            <a:off x="3649606" y="1556792"/>
+            <a:off x="3649606" y="835223"/>
             <a:ext cx="1844788" cy="369332"/>
           </a:xfrm>
           <a:prstGeom prst="rect">
@@ -468,7 +468,7 @@
         </p:nvSpPr>
         <p:spPr>
           <a:xfrm>
-            <a:off x="3572850" y="2564904"/>
+            <a:off x="3572850" y="2039778"/>
             <a:ext cx="1998301" cy="369332"/>
           </a:xfrm>
           <a:prstGeom prst="rect">
@@ -506,7 +506,7 @@
         </p:nvSpPr>
         <p:spPr>
           <a:xfrm>
-            <a:off x="3464760" y="3573016"/>
+            <a:off x="3464760" y="3244333"/>
             <a:ext cx="2214481" cy="369332"/>
           </a:xfrm>
           <a:prstGeom prst="rect">
@@ -531,6 +531,92 @@
             <a:endParaRPr lang="en-US" dirty="0">
               <a:solidFill>
                 <a:schemeClr val="accent1"/>
+              </a:solidFill>
+            </a:endParaRPr>
+          </a:p>
+        </p:txBody>
+      </p:sp>
+      <p:sp>
+        <p:nvSpPr>
+          <p:cNvPr id="5" name="TextBox 4"/>
+          <p:cNvSpPr txBox="1"/>
+          <p:nvPr/>
+        </p:nvSpPr>
+        <p:spPr>
+          <a:xfrm>
+            <a:off x="2906783" y="4448888"/>
+            <a:ext cx="3330434" cy="369332"/>
+          </a:xfrm>
+          <a:prstGeom prst="rect">
+            <a:avLst/>
+          </a:prstGeom>
+          <a:noFill/>
+        </p:spPr>
+        <p:txBody>
+          <a:bodyPr wrap="none" rtlCol="0">
+            <a:spAutoFit/>
+          </a:bodyPr>
+          <a:lstStyle/>
+          <a:p>
+            <a:r>
+              <a:rPr lang="en-US" dirty="0" smtClean="0">
+                <a:solidFill>
+                  <a:schemeClr val="accent4">
+                    <a:lumMod val="75000"/>
+                  </a:schemeClr>
+                </a:solidFill>
+              </a:rPr>
+              <a:t>text with theme color 25% darker</a:t>
+            </a:r>
+            <a:endParaRPr lang="en-US" dirty="0">
+              <a:solidFill>
+                <a:schemeClr val="accent4">
+                  <a:lumMod val="75000"/>
+                </a:schemeClr>
+              </a:solidFill>
+            </a:endParaRPr>
+          </a:p>
+        </p:txBody>
+      </p:sp>
+      <p:sp>
+        <p:nvSpPr>
+          <p:cNvPr id="6" name="TextBox 5"/>
+          <p:cNvSpPr txBox="1"/>
+          <p:nvPr/>
+        </p:nvSpPr>
+        <p:spPr>
+          <a:xfrm>
+            <a:off x="2908724" y="5653443"/>
+            <a:ext cx="3326552" cy="369332"/>
+          </a:xfrm>
+          <a:prstGeom prst="rect">
+            <a:avLst/>
+          </a:prstGeom>
+          <a:noFill/>
+        </p:spPr>
+        <p:txBody>
+          <a:bodyPr wrap="none" rtlCol="0">
+            <a:spAutoFit/>
+          </a:bodyPr>
+          <a:lstStyle/>
+          <a:p>
+            <a:r>
+              <a:rPr lang="en-US" dirty="0" smtClean="0">
+                <a:solidFill>
+                  <a:schemeClr val="accent1">
+                    <a:lumMod val="60000"/>
+                    <a:lumOff val="40000"/>
+                  </a:schemeClr>
+                </a:solidFill>
+              </a:rPr>
+              <a:t>text with theme color 40% lighter</a:t>
+            </a:r>
+            <a:endParaRPr lang="en-US" dirty="0">
+              <a:solidFill>
+                <a:schemeClr val="accent1">
+                  <a:lumMod val="60000"/>
+                  <a:lumOff val="40000"/>
+                </a:schemeClr>
               </a:solidFill>
             </a:endParaRPr>
           </a:p>

</xml_diff>